<commit_message>
Add Photo and Diagram
</commit_message>
<xml_diff>
--- a/2025년2학기_SE_과제_32214391_조현수_2분반.pptx
+++ b/2025년2학기_SE_과제_32214391_조현수_2분반.pptx
@@ -6,6 +6,12 @@
   </p:sldMasterIdLst>
   <p:sldIdLst>
     <p:sldId id="256" r:id="rId2"/>
+    <p:sldId id="257" r:id="rId3"/>
+    <p:sldId id="258" r:id="rId4"/>
+    <p:sldId id="259" r:id="rId5"/>
+    <p:sldId id="260" r:id="rId6"/>
+    <p:sldId id="262" r:id="rId7"/>
+    <p:sldId id="261" r:id="rId8"/>
   </p:sldIdLst>
   <p:sldSz cx="12192000" cy="6858000"/>
   <p:notesSz cx="6858000" cy="9144000"/>
@@ -3371,6 +3377,630 @@
 </p:sld>
 </file>
 
+<file path=ppt/slides/slide2.xml><?xml version="1.0" encoding="utf-8"?>
+<p:sld xmlns:r="http://schemas.openxmlformats.org/officeDocument/2006/relationships" xmlns:c="http://schemas.openxmlformats.org/drawingml/2006/chart" xmlns:a="http://schemas.openxmlformats.org/drawingml/2006/main" xmlns:dgm="http://schemas.openxmlformats.org/drawingml/2006/diagram" xmlns:dsp="http://schemas.microsoft.com/office/drawing/2008/diagram" xmlns:p="http://schemas.openxmlformats.org/presentationml/2006/main">
+  <p:cSld>
+    <p:spTree>
+      <p:nvGrpSpPr>
+        <p:cNvPr id="1" name=""/>
+        <p:cNvGrpSpPr/>
+        <p:nvPr/>
+      </p:nvGrpSpPr>
+      <p:grpSpPr>
+        <a:xfrm>
+          <a:off x="0" y="0"/>
+          <a:ext cx="0" cy="0"/>
+          <a:chOff x="0" y="0"/>
+          <a:chExt cx="0" cy="0"/>
+        </a:xfrm>
+      </p:grpSpPr>
+      <p:sp>
+        <p:nvSpPr>
+          <p:cNvPr id="2" name="제목 1"/>
+          <p:cNvSpPr>
+            <a:spLocks noGrp="1"/>
+          </p:cNvSpPr>
+          <p:nvPr>
+            <p:ph type="title" idx="0"/>
+          </p:nvPr>
+        </p:nvSpPr>
+        <p:spPr>
+          <a:xfrm>
+            <a:off x="609599" y="274638"/>
+            <a:ext cx="10972798" cy="571500"/>
+          </a:xfrm>
+        </p:spPr>
+        <p:txBody>
+          <a:bodyPr/>
+          <a:p>
+            <a:pPr algn="l">
+              <a:defRPr/>
+            </a:pPr>
+            <a:r>
+              <a:rPr lang="en-US" altLang="ko-KR" sz="3000"/>
+              <a:t>1.</a:t>
+            </a:r>
+            <a:r>
+              <a:rPr lang="ko-KR" altLang="en-US" sz="3000"/>
+              <a:t> 프로젝트 주제를 선정</a:t>
+            </a:r>
+            <a:endParaRPr lang="ko-KR" altLang="en-US" sz="3000"/>
+          </a:p>
+        </p:txBody>
+      </p:sp>
+      <p:sp>
+        <p:nvSpPr>
+          <p:cNvPr id="4" name="내용 개체 틀 2"/>
+          <p:cNvSpPr>
+            <a:spLocks noGrp="1"/>
+          </p:cNvSpPr>
+          <p:nvPr>
+            <p:ph idx="1"/>
+          </p:nvPr>
+        </p:nvSpPr>
+        <p:spPr>
+          <a:xfrm>
+            <a:off x="609599" y="846138"/>
+            <a:ext cx="10972798" cy="5280025"/>
+          </a:xfrm>
+        </p:spPr>
+        <p:txBody>
+          <a:bodyPr/>
+          <a:p>
+            <a:pPr>
+              <a:defRPr/>
+            </a:pPr>
+            <a:r>
+              <a:rPr lang="ko-KR" altLang="en-US"/>
+              <a:t/>
+            </a:r>
+            <a:endParaRPr lang="ko-KR" altLang="en-US"/>
+          </a:p>
+        </p:txBody>
+      </p:sp>
+    </p:spTree>
+    <p:extLst>
+      <p:ext uri="{BB962C8B-B14F-4D97-AF65-F5344CB8AC3E}">
+        <p14:creationId xmlns:p14="http://schemas.microsoft.com/office/powerpoint/2010/main" val="597175495"/>
+      </p:ext>
+    </p:extLst>
+  </p:cSld>
+  <p:clrMapOvr>
+    <a:masterClrMapping/>
+  </p:clrMapOvr>
+  <mc:AlternateContent xmlns:mc="http://schemas.openxmlformats.org/markup-compatibility/2006">
+    <mc:Choice xmlns:p14="http://schemas.microsoft.com/office/powerpoint/2010/main" Requires="p14">
+      <p:transition xmlns:mc="http://schemas.openxmlformats.org/markup-compatibility/2006" xmlns:p14="http://schemas.microsoft.com/office/powerpoint/2010/main" mc:Ignorable="p14" p14:dur="500"/>
+    </mc:Choice>
+    <mc:Fallback>
+      <p:transition/>
+    </mc:Fallback>
+  </mc:AlternateContent>
+</p:sld>
+</file>
+
+<file path=ppt/slides/slide3.xml><?xml version="1.0" encoding="utf-8"?>
+<p:sld xmlns:r="http://schemas.openxmlformats.org/officeDocument/2006/relationships" xmlns:c="http://schemas.openxmlformats.org/drawingml/2006/chart" xmlns:a="http://schemas.openxmlformats.org/drawingml/2006/main" xmlns:dgm="http://schemas.openxmlformats.org/drawingml/2006/diagram" xmlns:dsp="http://schemas.microsoft.com/office/drawing/2008/diagram" xmlns:p="http://schemas.openxmlformats.org/presentationml/2006/main">
+  <p:cSld>
+    <p:spTree>
+      <p:nvGrpSpPr>
+        <p:cNvPr id="1" name=""/>
+        <p:cNvGrpSpPr/>
+        <p:nvPr/>
+      </p:nvGrpSpPr>
+      <p:grpSpPr>
+        <a:xfrm>
+          <a:off x="0" y="0"/>
+          <a:ext cx="0" cy="0"/>
+          <a:chOff x="0" y="0"/>
+          <a:chExt cx="0" cy="0"/>
+        </a:xfrm>
+      </p:grpSpPr>
+      <p:sp>
+        <p:nvSpPr>
+          <p:cNvPr id="2" name="제목 1"/>
+          <p:cNvSpPr>
+            <a:spLocks noGrp="1"/>
+          </p:cNvSpPr>
+          <p:nvPr>
+            <p:ph type="title" idx="0"/>
+          </p:nvPr>
+        </p:nvSpPr>
+        <p:spPr>
+          <a:xfrm>
+            <a:off x="609599" y="274638"/>
+            <a:ext cx="10972798" cy="571500"/>
+          </a:xfrm>
+        </p:spPr>
+        <p:txBody>
+          <a:bodyPr/>
+          <a:p>
+            <a:pPr algn="l">
+              <a:defRPr/>
+            </a:pPr>
+            <a:r>
+              <a:rPr lang="en-US" altLang="ko-KR" sz="3000"/>
+              <a:t>2.</a:t>
+            </a:r>
+            <a:r>
+              <a:rPr lang="ko-KR" altLang="en-US" sz="3000"/>
+              <a:t> UML 다이어그램</a:t>
+            </a:r>
+            <a:endParaRPr lang="ko-KR" altLang="en-US" sz="3000"/>
+          </a:p>
+        </p:txBody>
+      </p:sp>
+      <p:sp>
+        <p:nvSpPr>
+          <p:cNvPr id="4" name="내용 개체 틀 2"/>
+          <p:cNvSpPr>
+            <a:spLocks noGrp="1"/>
+          </p:cNvSpPr>
+          <p:nvPr>
+            <p:ph idx="1"/>
+          </p:nvPr>
+        </p:nvSpPr>
+        <p:spPr>
+          <a:xfrm>
+            <a:off x="609599" y="846138"/>
+            <a:ext cx="10972798" cy="5280025"/>
+          </a:xfrm>
+        </p:spPr>
+        <p:txBody>
+          <a:bodyPr/>
+          <a:p>
+            <a:pPr>
+              <a:defRPr/>
+            </a:pPr>
+            <a:r>
+              <a:rPr lang="ko-KR" altLang="en-US"/>
+              <a:t/>
+            </a:r>
+            <a:endParaRPr lang="ko-KR" altLang="en-US"/>
+          </a:p>
+        </p:txBody>
+      </p:sp>
+    </p:spTree>
+    <p:extLst>
+      <p:ext uri="{BB962C8B-B14F-4D97-AF65-F5344CB8AC3E}">
+        <p14:creationId xmlns:p14="http://schemas.microsoft.com/office/powerpoint/2010/main" val="4108412027"/>
+      </p:ext>
+    </p:extLst>
+  </p:cSld>
+  <p:clrMapOvr>
+    <a:masterClrMapping/>
+  </p:clrMapOvr>
+  <mc:AlternateContent xmlns:mc="http://schemas.openxmlformats.org/markup-compatibility/2006">
+    <mc:Choice xmlns:p14="http://schemas.microsoft.com/office/powerpoint/2010/main" Requires="p14">
+      <p:transition xmlns:mc="http://schemas.openxmlformats.org/markup-compatibility/2006" xmlns:p14="http://schemas.microsoft.com/office/powerpoint/2010/main" mc:Ignorable="p14" p14:dur="500"/>
+    </mc:Choice>
+    <mc:Fallback>
+      <p:transition/>
+    </mc:Fallback>
+  </mc:AlternateContent>
+</p:sld>
+</file>
+
+<file path=ppt/slides/slide4.xml><?xml version="1.0" encoding="utf-8"?>
+<p:sld xmlns:r="http://schemas.openxmlformats.org/officeDocument/2006/relationships" xmlns:c="http://schemas.openxmlformats.org/drawingml/2006/chart" xmlns:a="http://schemas.openxmlformats.org/drawingml/2006/main" xmlns:dgm="http://schemas.openxmlformats.org/drawingml/2006/diagram" xmlns:dsp="http://schemas.microsoft.com/office/drawing/2008/diagram" xmlns:p="http://schemas.openxmlformats.org/presentationml/2006/main">
+  <p:cSld>
+    <p:spTree>
+      <p:nvGrpSpPr>
+        <p:cNvPr id="1" name=""/>
+        <p:cNvGrpSpPr/>
+        <p:nvPr/>
+      </p:nvGrpSpPr>
+      <p:grpSpPr>
+        <a:xfrm>
+          <a:off x="0" y="0"/>
+          <a:ext cx="0" cy="0"/>
+          <a:chOff x="0" y="0"/>
+          <a:chExt cx="0" cy="0"/>
+        </a:xfrm>
+      </p:grpSpPr>
+      <p:sp>
+        <p:nvSpPr>
+          <p:cNvPr id="2" name="제목 1"/>
+          <p:cNvSpPr>
+            <a:spLocks noGrp="1"/>
+          </p:cNvSpPr>
+          <p:nvPr>
+            <p:ph type="title" idx="0"/>
+          </p:nvPr>
+        </p:nvSpPr>
+        <p:spPr>
+          <a:xfrm>
+            <a:off x="609599" y="274638"/>
+            <a:ext cx="10972798" cy="571500"/>
+          </a:xfrm>
+        </p:spPr>
+        <p:txBody>
+          <a:bodyPr/>
+          <a:p>
+            <a:pPr algn="l">
+              <a:defRPr/>
+            </a:pPr>
+            <a:r>
+              <a:rPr lang="en-US" altLang="ko-KR" sz="3000"/>
+              <a:t>3.</a:t>
+            </a:r>
+            <a:r>
+              <a:rPr lang="ko-KR" altLang="en-US" sz="3000"/>
+              <a:t> 설계 원리적용</a:t>
+            </a:r>
+            <a:endParaRPr lang="ko-KR" altLang="en-US" sz="3000"/>
+          </a:p>
+        </p:txBody>
+      </p:sp>
+      <p:sp>
+        <p:nvSpPr>
+          <p:cNvPr id="4" name="내용 개체 틀 2"/>
+          <p:cNvSpPr>
+            <a:spLocks noGrp="1"/>
+          </p:cNvSpPr>
+          <p:nvPr>
+            <p:ph idx="1"/>
+          </p:nvPr>
+        </p:nvSpPr>
+        <p:spPr>
+          <a:xfrm>
+            <a:off x="609599" y="846138"/>
+            <a:ext cx="10972798" cy="5280025"/>
+          </a:xfrm>
+        </p:spPr>
+        <p:txBody>
+          <a:bodyPr/>
+          <a:p>
+            <a:pPr>
+              <a:defRPr/>
+            </a:pPr>
+            <a:r>
+              <a:rPr lang="ko-KR" altLang="en-US"/>
+              <a:t/>
+            </a:r>
+            <a:endParaRPr lang="ko-KR" altLang="en-US"/>
+          </a:p>
+        </p:txBody>
+      </p:sp>
+    </p:spTree>
+    <p:extLst>
+      <p:ext uri="{BB962C8B-B14F-4D97-AF65-F5344CB8AC3E}">
+        <p14:creationId xmlns:p14="http://schemas.microsoft.com/office/powerpoint/2010/main" val="935525025"/>
+      </p:ext>
+    </p:extLst>
+  </p:cSld>
+  <p:clrMapOvr>
+    <a:masterClrMapping/>
+  </p:clrMapOvr>
+  <mc:AlternateContent xmlns:mc="http://schemas.openxmlformats.org/markup-compatibility/2006">
+    <mc:Choice xmlns:p14="http://schemas.microsoft.com/office/powerpoint/2010/main" Requires="p14">
+      <p:transition xmlns:mc="http://schemas.openxmlformats.org/markup-compatibility/2006" xmlns:p14="http://schemas.microsoft.com/office/powerpoint/2010/main" mc:Ignorable="p14" p14:dur="500"/>
+    </mc:Choice>
+    <mc:Fallback>
+      <p:transition/>
+    </mc:Fallback>
+  </mc:AlternateContent>
+</p:sld>
+</file>
+
+<file path=ppt/slides/slide5.xml><?xml version="1.0" encoding="utf-8"?>
+<p:sld xmlns:r="http://schemas.openxmlformats.org/officeDocument/2006/relationships" xmlns:c="http://schemas.openxmlformats.org/drawingml/2006/chart" xmlns:a="http://schemas.openxmlformats.org/drawingml/2006/main" xmlns:dgm="http://schemas.openxmlformats.org/drawingml/2006/diagram" xmlns:dsp="http://schemas.microsoft.com/office/drawing/2008/diagram" xmlns:p="http://schemas.openxmlformats.org/presentationml/2006/main">
+  <p:cSld>
+    <p:spTree>
+      <p:nvGrpSpPr>
+        <p:cNvPr id="1" name=""/>
+        <p:cNvGrpSpPr/>
+        <p:nvPr/>
+      </p:nvGrpSpPr>
+      <p:grpSpPr>
+        <a:xfrm>
+          <a:off x="0" y="0"/>
+          <a:ext cx="0" cy="0"/>
+          <a:chOff x="0" y="0"/>
+          <a:chExt cx="0" cy="0"/>
+        </a:xfrm>
+      </p:grpSpPr>
+      <p:sp>
+        <p:nvSpPr>
+          <p:cNvPr id="2" name="제목 1"/>
+          <p:cNvSpPr>
+            <a:spLocks noGrp="1"/>
+          </p:cNvSpPr>
+          <p:nvPr>
+            <p:ph type="title" idx="0"/>
+          </p:nvPr>
+        </p:nvSpPr>
+        <p:spPr>
+          <a:xfrm>
+            <a:off x="609599" y="274638"/>
+            <a:ext cx="10972798" cy="571500"/>
+          </a:xfrm>
+        </p:spPr>
+        <p:txBody>
+          <a:bodyPr/>
+          <a:p>
+            <a:pPr algn="l">
+              <a:defRPr/>
+            </a:pPr>
+            <a:r>
+              <a:rPr lang="en-US" altLang="ko-KR" sz="3000"/>
+              <a:t> 4. 클래스 설계</a:t>
+            </a:r>
+            <a:r>
+              <a:rPr lang="ko-KR" altLang="en-US" sz="3000"/>
+              <a:t> </a:t>
+            </a:r>
+            <a:r>
+              <a:rPr lang="en-US" altLang="ko-KR" sz="3000"/>
+              <a:t>원칙</a:t>
+            </a:r>
+            <a:r>
+              <a:rPr lang="ko-KR" altLang="en-US" sz="3000"/>
+              <a:t> </a:t>
+            </a:r>
+            <a:r>
+              <a:rPr lang="en-US" altLang="ko-KR" sz="3000"/>
+              <a:t>적용</a:t>
+            </a:r>
+            <a:endParaRPr lang="en-US" altLang="ko-KR" sz="3000"/>
+          </a:p>
+        </p:txBody>
+      </p:sp>
+      <p:sp>
+        <p:nvSpPr>
+          <p:cNvPr id="4" name="내용 개체 틀 2"/>
+          <p:cNvSpPr>
+            <a:spLocks noGrp="1"/>
+          </p:cNvSpPr>
+          <p:nvPr>
+            <p:ph idx="1"/>
+          </p:nvPr>
+        </p:nvSpPr>
+        <p:spPr>
+          <a:xfrm>
+            <a:off x="609599" y="846138"/>
+            <a:ext cx="10972798" cy="5280025"/>
+          </a:xfrm>
+        </p:spPr>
+        <p:txBody>
+          <a:bodyPr/>
+          <a:p>
+            <a:pPr>
+              <a:defRPr/>
+            </a:pPr>
+            <a:r>
+              <a:rPr lang="ko-KR" altLang="en-US"/>
+              <a:t/>
+            </a:r>
+            <a:endParaRPr lang="ko-KR" altLang="en-US"/>
+          </a:p>
+        </p:txBody>
+      </p:sp>
+    </p:spTree>
+    <p:extLst>
+      <p:ext uri="{BB962C8B-B14F-4D97-AF65-F5344CB8AC3E}">
+        <p14:creationId xmlns:p14="http://schemas.microsoft.com/office/powerpoint/2010/main" val="806497847"/>
+      </p:ext>
+    </p:extLst>
+  </p:cSld>
+  <p:clrMapOvr>
+    <a:masterClrMapping/>
+  </p:clrMapOvr>
+  <mc:AlternateContent xmlns:mc="http://schemas.openxmlformats.org/markup-compatibility/2006">
+    <mc:Choice xmlns:p14="http://schemas.microsoft.com/office/powerpoint/2010/main" Requires="p14">
+      <p:transition xmlns:mc="http://schemas.openxmlformats.org/markup-compatibility/2006" xmlns:p14="http://schemas.microsoft.com/office/powerpoint/2010/main" mc:Ignorable="p14" p14:dur="500"/>
+    </mc:Choice>
+    <mc:Fallback>
+      <p:transition/>
+    </mc:Fallback>
+  </mc:AlternateContent>
+</p:sld>
+</file>
+
+<file path=ppt/slides/slide6.xml><?xml version="1.0" encoding="utf-8"?>
+<p:sld xmlns:r="http://schemas.openxmlformats.org/officeDocument/2006/relationships" xmlns:c="http://schemas.openxmlformats.org/drawingml/2006/chart" xmlns:a="http://schemas.openxmlformats.org/drawingml/2006/main" xmlns:dgm="http://schemas.openxmlformats.org/drawingml/2006/diagram" xmlns:dsp="http://schemas.microsoft.com/office/drawing/2008/diagram" xmlns:p="http://schemas.openxmlformats.org/presentationml/2006/main">
+  <p:cSld>
+    <p:spTree>
+      <p:nvGrpSpPr>
+        <p:cNvPr id="1" name=""/>
+        <p:cNvGrpSpPr/>
+        <p:nvPr/>
+      </p:nvGrpSpPr>
+      <p:grpSpPr>
+        <a:xfrm>
+          <a:off x="0" y="0"/>
+          <a:ext cx="0" cy="0"/>
+          <a:chOff x="0" y="0"/>
+          <a:chExt cx="0" cy="0"/>
+        </a:xfrm>
+      </p:grpSpPr>
+      <p:sp>
+        <p:nvSpPr>
+          <p:cNvPr id="2" name="제목 1"/>
+          <p:cNvSpPr>
+            <a:spLocks noGrp="1"/>
+          </p:cNvSpPr>
+          <p:nvPr>
+            <p:ph type="title" idx="0"/>
+          </p:nvPr>
+        </p:nvSpPr>
+        <p:spPr>
+          <a:xfrm>
+            <a:off x="609599" y="274638"/>
+            <a:ext cx="10972798" cy="571500"/>
+          </a:xfrm>
+        </p:spPr>
+        <p:txBody>
+          <a:bodyPr/>
+          <a:p>
+            <a:pPr algn="l">
+              <a:defRPr/>
+            </a:pPr>
+            <a:r>
+              <a:rPr lang="en-US" altLang="ko-KR" sz="3000"/>
+              <a:t> 5. 아키텍처 &amp; 프레임워크</a:t>
+            </a:r>
+            <a:endParaRPr lang="en-US" altLang="ko-KR" sz="3000"/>
+          </a:p>
+        </p:txBody>
+      </p:sp>
+      <p:sp>
+        <p:nvSpPr>
+          <p:cNvPr id="4" name="내용 개체 틀 2"/>
+          <p:cNvSpPr>
+            <a:spLocks noGrp="1"/>
+          </p:cNvSpPr>
+          <p:nvPr>
+            <p:ph idx="1"/>
+          </p:nvPr>
+        </p:nvSpPr>
+        <p:spPr>
+          <a:xfrm>
+            <a:off x="609599" y="846138"/>
+            <a:ext cx="10972798" cy="5280025"/>
+          </a:xfrm>
+        </p:spPr>
+        <p:txBody>
+          <a:bodyPr/>
+          <a:p>
+            <a:pPr>
+              <a:defRPr/>
+            </a:pPr>
+            <a:r>
+              <a:rPr lang="ko-KR" altLang="en-US"/>
+              <a:t/>
+            </a:r>
+            <a:endParaRPr lang="ko-KR" altLang="en-US"/>
+          </a:p>
+        </p:txBody>
+      </p:sp>
+    </p:spTree>
+    <p:extLst>
+      <p:ext uri="{BB962C8B-B14F-4D97-AF65-F5344CB8AC3E}">
+        <p14:creationId xmlns:p14="http://schemas.microsoft.com/office/powerpoint/2010/main" val="2793164190"/>
+      </p:ext>
+    </p:extLst>
+  </p:cSld>
+  <p:clrMapOvr>
+    <a:masterClrMapping/>
+  </p:clrMapOvr>
+  <mc:AlternateContent xmlns:mc="http://schemas.openxmlformats.org/markup-compatibility/2006">
+    <mc:Choice xmlns:p14="http://schemas.microsoft.com/office/powerpoint/2010/main" Requires="p14">
+      <p:transition xmlns:mc="http://schemas.openxmlformats.org/markup-compatibility/2006" xmlns:p14="http://schemas.microsoft.com/office/powerpoint/2010/main" mc:Ignorable="p14" p14:dur="500"/>
+    </mc:Choice>
+    <mc:Fallback>
+      <p:transition/>
+    </mc:Fallback>
+  </mc:AlternateContent>
+</p:sld>
+</file>
+
+<file path=ppt/slides/slide7.xml><?xml version="1.0" encoding="utf-8"?>
+<p:sld xmlns:r="http://schemas.openxmlformats.org/officeDocument/2006/relationships" xmlns:c="http://schemas.openxmlformats.org/drawingml/2006/chart" xmlns:a="http://schemas.openxmlformats.org/drawingml/2006/main" xmlns:dgm="http://schemas.openxmlformats.org/drawingml/2006/diagram" xmlns:dsp="http://schemas.microsoft.com/office/drawing/2008/diagram" xmlns:p="http://schemas.openxmlformats.org/presentationml/2006/main">
+  <p:cSld>
+    <p:spTree>
+      <p:nvGrpSpPr>
+        <p:cNvPr id="1" name=""/>
+        <p:cNvGrpSpPr/>
+        <p:nvPr/>
+      </p:nvGrpSpPr>
+      <p:grpSpPr>
+        <a:xfrm>
+          <a:off x="0" y="0"/>
+          <a:ext cx="0" cy="0"/>
+          <a:chOff x="0" y="0"/>
+          <a:chExt cx="0" cy="0"/>
+        </a:xfrm>
+      </p:grpSpPr>
+      <p:sp>
+        <p:nvSpPr>
+          <p:cNvPr id="2" name="제목 1"/>
+          <p:cNvSpPr>
+            <a:spLocks noGrp="1"/>
+          </p:cNvSpPr>
+          <p:nvPr>
+            <p:ph type="title" idx="0"/>
+          </p:nvPr>
+        </p:nvSpPr>
+        <p:spPr>
+          <a:xfrm>
+            <a:off x="609599" y="274638"/>
+            <a:ext cx="10972798" cy="571500"/>
+          </a:xfrm>
+        </p:spPr>
+        <p:txBody>
+          <a:bodyPr/>
+          <a:p>
+            <a:pPr algn="l">
+              <a:defRPr/>
+            </a:pPr>
+            <a:r>
+              <a:rPr lang="ko-KR" altLang="en-US" sz="3000"/>
+              <a:t> </a:t>
+            </a:r>
+            <a:r>
+              <a:rPr lang="en-US" altLang="ko-KR" sz="3000"/>
+              <a:t>6. 디자인 패턴</a:t>
+            </a:r>
+            <a:r>
+              <a:rPr lang="ko-KR" altLang="en-US" sz="3000"/>
+              <a:t> </a:t>
+            </a:r>
+            <a:r>
+              <a:rPr lang="en-US" altLang="ko-KR" sz="3000"/>
+              <a:t>적용</a:t>
+            </a:r>
+            <a:endParaRPr lang="en-US" altLang="ko-KR" sz="3000"/>
+          </a:p>
+        </p:txBody>
+      </p:sp>
+      <p:sp>
+        <p:nvSpPr>
+          <p:cNvPr id="4" name="내용 개체 틀 2"/>
+          <p:cNvSpPr>
+            <a:spLocks noGrp="1"/>
+          </p:cNvSpPr>
+          <p:nvPr>
+            <p:ph idx="1"/>
+          </p:nvPr>
+        </p:nvSpPr>
+        <p:spPr>
+          <a:xfrm>
+            <a:off x="609599" y="846138"/>
+            <a:ext cx="10972798" cy="5280025"/>
+          </a:xfrm>
+        </p:spPr>
+        <p:txBody>
+          <a:bodyPr/>
+          <a:p>
+            <a:pPr>
+              <a:defRPr/>
+            </a:pPr>
+            <a:endParaRPr lang="ko-KR" altLang="en-US"/>
+          </a:p>
+        </p:txBody>
+      </p:sp>
+    </p:spTree>
+    <p:extLst>
+      <p:ext uri="{BB962C8B-B14F-4D97-AF65-F5344CB8AC3E}">
+        <p14:creationId xmlns:p14="http://schemas.microsoft.com/office/powerpoint/2010/main" val="3530579894"/>
+      </p:ext>
+    </p:extLst>
+  </p:cSld>
+  <p:clrMapOvr>
+    <a:masterClrMapping/>
+  </p:clrMapOvr>
+  <mc:AlternateContent xmlns:mc="http://schemas.openxmlformats.org/markup-compatibility/2006">
+    <mc:Choice xmlns:p14="http://schemas.microsoft.com/office/powerpoint/2010/main" Requires="p14">
+      <p:transition xmlns:mc="http://schemas.openxmlformats.org/markup-compatibility/2006" xmlns:p14="http://schemas.microsoft.com/office/powerpoint/2010/main" mc:Ignorable="p14" p14:dur="500"/>
+    </mc:Choice>
+    <mc:Fallback>
+      <p:transition/>
+    </mc:Fallback>
+  </mc:AlternateContent>
+</p:sld>
+</file>
+
 <file path=ppt/theme/theme1.xml><?xml version="1.0" encoding="utf-8"?>
 <a:theme xmlns:r="http://schemas.openxmlformats.org/officeDocument/2006/relationships" xmlns:c="http://schemas.openxmlformats.org/drawingml/2006/chart" xmlns:dgm="http://schemas.openxmlformats.org/drawingml/2006/diagram" xmlns:dsp="http://schemas.microsoft.com/office/drawing/2008/diagram" xmlns:a="http://schemas.openxmlformats.org/drawingml/2006/main" xmlns:pic="http://schemas.openxmlformats.org/drawingml/2006/picture" xmlns:wp="http://schemas.openxmlformats.org/drawingml/2006/wordprocessingDrawing" xmlns:xdr="http://schemas.openxmlformats.org/drawingml/2006/spreadsheetDrawing" xmlns:lc="http://schemas.openxmlformats.org/drawingml/2006/lockedCanvas" xmlns:p="http://schemas.openxmlformats.org/presentationml/2006/main" name="한컴오피스">
   <a:themeElements>

</xml_diff>

<commit_message>
Update image and ppt
</commit_message>
<xml_diff>
--- a/2025년2학기_SE_과제_32214391_조현수_2분반.pptx
+++ b/2025년2학기_SE_과제_32214391_조현수_2분반.pptx
@@ -3422,7 +3422,7 @@
             </a:r>
             <a:r>
               <a:rPr lang="ko-KR" altLang="en-US" sz="3000"/>
-              <a:t> 프로젝트 주제를 선정</a:t>
+              <a:t> 주제 선정</a:t>
             </a:r>
             <a:endParaRPr lang="ko-KR" altLang="en-US" sz="3000"/>
           </a:p>
@@ -3440,8 +3440,8 @@
         </p:nvSpPr>
         <p:spPr>
           <a:xfrm>
-            <a:off x="609599" y="846138"/>
-            <a:ext cx="10972798" cy="5280025"/>
+            <a:off x="6380629" y="846138"/>
+            <a:ext cx="5201768" cy="5280025"/>
           </a:xfrm>
         </p:spPr>
         <p:txBody>
@@ -3458,6 +3458,30 @@
           </a:p>
         </p:txBody>
       </p:sp>
+      <p:pic>
+        <p:nvPicPr>
+          <p:cNvPr id="5" name=""/>
+          <p:cNvPicPr>
+            <a:picLocks noChangeAspect="1"/>
+          </p:cNvPicPr>
+          <p:nvPr/>
+        </p:nvPicPr>
+        <p:blipFill rotWithShape="1">
+          <a:blip r:embed="rId2"/>
+          <a:stretch>
+            <a:fillRect/>
+          </a:stretch>
+        </p:blipFill>
+        <p:spPr>
+          <a:xfrm>
+            <a:off x="609599" y="958999"/>
+            <a:ext cx="4175760" cy="3528060"/>
+          </a:xfrm>
+          <a:prstGeom prst="rect">
+            <a:avLst/>
+          </a:prstGeom>
+        </p:spPr>
+      </p:pic>
     </p:spTree>
     <p:extLst>
       <p:ext uri="{BB962C8B-B14F-4D97-AF65-F5344CB8AC3E}">

</xml_diff>